<commit_message>
More work on part 1
</commit_message>
<xml_diff>
--- a/OpenCafeTraining-Part1.pptx
+++ b/OpenCafeTraining-Part1.pptx
@@ -2,7 +2,7 @@
 <file path=ppt/presentation.xml><?xml version="1.0" encoding="utf-8"?>
 <p:presentation xmlns:a="http://schemas.openxmlformats.org/drawingml/2006/main" xmlns:r="http://schemas.openxmlformats.org/officeDocument/2006/relationships" xmlns:p="http://schemas.openxmlformats.org/presentationml/2006/main" saveSubsetFonts="1">
   <p:sldMasterIdLst>
-    <p:sldMasterId id="2147483648" r:id="rId1"/>
+    <p:sldMasterId id="2147483750" r:id="rId1"/>
   </p:sldMasterIdLst>
   <p:sldIdLst>
     <p:sldId id="256" r:id="rId2"/>
@@ -14,6 +14,10 @@
     <p:sldId id="262" r:id="rId8"/>
     <p:sldId id="263" r:id="rId9"/>
     <p:sldId id="264" r:id="rId10"/>
+    <p:sldId id="265" r:id="rId11"/>
+    <p:sldId id="266" r:id="rId12"/>
+    <p:sldId id="268" r:id="rId13"/>
+    <p:sldId id="267" r:id="rId14"/>
   </p:sldIdLst>
   <p:sldSz cx="12192000" cy="6858000"/>
   <p:notesSz cx="6858000" cy="9144000"/>
@@ -142,7 +146,7 @@
           <p:cNvPr id="2" name="Title 1">
             <a:extLst>
               <a:ext uri="{FF2B5EF4-FFF2-40B4-BE49-F238E27FC236}">
-                <a16:creationId xmlns:a16="http://schemas.microsoft.com/office/drawing/2014/main" id="{71234480-7A96-47B0-B4C7-94EDDA2F9588}"/>
+                <a16:creationId xmlns:a16="http://schemas.microsoft.com/office/drawing/2014/main" id="{C6C038C7-1173-4BEF-A19B-CDE977D21808}"/>
               </a:ext>
             </a:extLst>
           </p:cNvPr>
@@ -179,7 +183,7 @@
           <p:cNvPr id="3" name="Subtitle 2">
             <a:extLst>
               <a:ext uri="{FF2B5EF4-FFF2-40B4-BE49-F238E27FC236}">
-                <a16:creationId xmlns:a16="http://schemas.microsoft.com/office/drawing/2014/main" id="{DD7AA85A-89FC-4475-B11D-9E174F33C5D3}"/>
+                <a16:creationId xmlns:a16="http://schemas.microsoft.com/office/drawing/2014/main" id="{F54C74A2-12C9-4656-AD4C-2D9B9F0DDE6D}"/>
               </a:ext>
             </a:extLst>
           </p:cNvPr>
@@ -249,7 +253,7 @@
           <p:cNvPr id="4" name="Date Placeholder 3">
             <a:extLst>
               <a:ext uri="{FF2B5EF4-FFF2-40B4-BE49-F238E27FC236}">
-                <a16:creationId xmlns:a16="http://schemas.microsoft.com/office/drawing/2014/main" id="{C6E7C713-6894-4FFC-A802-AE034D741058}"/>
+                <a16:creationId xmlns:a16="http://schemas.microsoft.com/office/drawing/2014/main" id="{3C02439B-B648-435C-8136-5A8C65880AD9}"/>
               </a:ext>
             </a:extLst>
           </p:cNvPr>
@@ -278,7 +282,7 @@
           <p:cNvPr id="5" name="Footer Placeholder 4">
             <a:extLst>
               <a:ext uri="{FF2B5EF4-FFF2-40B4-BE49-F238E27FC236}">
-                <a16:creationId xmlns:a16="http://schemas.microsoft.com/office/drawing/2014/main" id="{7733346C-4213-4CBE-BA28-C0622221FB0B}"/>
+                <a16:creationId xmlns:a16="http://schemas.microsoft.com/office/drawing/2014/main" id="{3DF7E223-2A74-4AFD-BC17-5480C6AC0BF7}"/>
               </a:ext>
             </a:extLst>
           </p:cNvPr>
@@ -303,7 +307,7 @@
           <p:cNvPr id="6" name="Slide Number Placeholder 5">
             <a:extLst>
               <a:ext uri="{FF2B5EF4-FFF2-40B4-BE49-F238E27FC236}">
-                <a16:creationId xmlns:a16="http://schemas.microsoft.com/office/drawing/2014/main" id="{C8C7D1ED-C944-44E9-BD22-8C22AC6DF678}"/>
+                <a16:creationId xmlns:a16="http://schemas.microsoft.com/office/drawing/2014/main" id="{C3D27DB7-F55F-4300-B7EF-E413D48A05B7}"/>
               </a:ext>
             </a:extLst>
           </p:cNvPr>
@@ -330,7 +334,7 @@
     </p:spTree>
     <p:extLst>
       <p:ext uri="{BB962C8B-B14F-4D97-AF65-F5344CB8AC3E}">
-        <p14:creationId xmlns:p14="http://schemas.microsoft.com/office/powerpoint/2010/main" val="2065101144"/>
+        <p14:creationId xmlns:p14="http://schemas.microsoft.com/office/powerpoint/2010/main" val="3054018935"/>
       </p:ext>
     </p:extLst>
   </p:cSld>
@@ -362,7 +366,7 @@
           <p:cNvPr id="2" name="Title 1">
             <a:extLst>
               <a:ext uri="{FF2B5EF4-FFF2-40B4-BE49-F238E27FC236}">
-                <a16:creationId xmlns:a16="http://schemas.microsoft.com/office/drawing/2014/main" id="{938ADA60-FE62-4670-8AEC-9FF5CAE80C70}"/>
+                <a16:creationId xmlns:a16="http://schemas.microsoft.com/office/drawing/2014/main" id="{EC795B32-F905-44D0-9A4D-C66190CE9214}"/>
               </a:ext>
             </a:extLst>
           </p:cNvPr>
@@ -390,7 +394,7 @@
           <p:cNvPr id="3" name="Vertical Text Placeholder 2">
             <a:extLst>
               <a:ext uri="{FF2B5EF4-FFF2-40B4-BE49-F238E27FC236}">
-                <a16:creationId xmlns:a16="http://schemas.microsoft.com/office/drawing/2014/main" id="{9A6CA1B0-094D-4CAD-900B-26360F686311}"/>
+                <a16:creationId xmlns:a16="http://schemas.microsoft.com/office/drawing/2014/main" id="{64EB1FCA-0A4D-4245-9789-9E11A08ADAF2}"/>
               </a:ext>
             </a:extLst>
           </p:cNvPr>
@@ -447,7 +451,7 @@
           <p:cNvPr id="4" name="Date Placeholder 3">
             <a:extLst>
               <a:ext uri="{FF2B5EF4-FFF2-40B4-BE49-F238E27FC236}">
-                <a16:creationId xmlns:a16="http://schemas.microsoft.com/office/drawing/2014/main" id="{1791149C-23C7-4562-8AA2-C3C459B2FE7D}"/>
+                <a16:creationId xmlns:a16="http://schemas.microsoft.com/office/drawing/2014/main" id="{88E73D7E-38E1-4FD9-B9FF-AB829F55606B}"/>
               </a:ext>
             </a:extLst>
           </p:cNvPr>
@@ -476,7 +480,7 @@
           <p:cNvPr id="5" name="Footer Placeholder 4">
             <a:extLst>
               <a:ext uri="{FF2B5EF4-FFF2-40B4-BE49-F238E27FC236}">
-                <a16:creationId xmlns:a16="http://schemas.microsoft.com/office/drawing/2014/main" id="{6DC475B1-F6EA-4283-825E-3A872BF4098E}"/>
+                <a16:creationId xmlns:a16="http://schemas.microsoft.com/office/drawing/2014/main" id="{EF428779-DB8A-4937-AE68-C2530A25F495}"/>
               </a:ext>
             </a:extLst>
           </p:cNvPr>
@@ -501,7 +505,7 @@
           <p:cNvPr id="6" name="Slide Number Placeholder 5">
             <a:extLst>
               <a:ext uri="{FF2B5EF4-FFF2-40B4-BE49-F238E27FC236}">
-                <a16:creationId xmlns:a16="http://schemas.microsoft.com/office/drawing/2014/main" id="{03020AB9-0A5F-4C5A-BD83-D8406E4A2A0B}"/>
+                <a16:creationId xmlns:a16="http://schemas.microsoft.com/office/drawing/2014/main" id="{E1BA323F-9C4F-4125-BAD7-7F35801FF9B5}"/>
               </a:ext>
             </a:extLst>
           </p:cNvPr>
@@ -528,7 +532,7 @@
     </p:spTree>
     <p:extLst>
       <p:ext uri="{BB962C8B-B14F-4D97-AF65-F5344CB8AC3E}">
-        <p14:creationId xmlns:p14="http://schemas.microsoft.com/office/powerpoint/2010/main" val="1077893326"/>
+        <p14:creationId xmlns:p14="http://schemas.microsoft.com/office/powerpoint/2010/main" val="422418721"/>
       </p:ext>
     </p:extLst>
   </p:cSld>
@@ -560,7 +564,7 @@
           <p:cNvPr id="2" name="Vertical Title 1">
             <a:extLst>
               <a:ext uri="{FF2B5EF4-FFF2-40B4-BE49-F238E27FC236}">
-                <a16:creationId xmlns:a16="http://schemas.microsoft.com/office/drawing/2014/main" id="{254FE383-EDFB-4452-AF30-377DF0142E0D}"/>
+                <a16:creationId xmlns:a16="http://schemas.microsoft.com/office/drawing/2014/main" id="{E2A08D39-B423-4D2F-8070-CE13BC65F4F1}"/>
               </a:ext>
             </a:extLst>
           </p:cNvPr>
@@ -593,7 +597,7 @@
           <p:cNvPr id="3" name="Vertical Text Placeholder 2">
             <a:extLst>
               <a:ext uri="{FF2B5EF4-FFF2-40B4-BE49-F238E27FC236}">
-                <a16:creationId xmlns:a16="http://schemas.microsoft.com/office/drawing/2014/main" id="{0D2B09C9-26BA-4F60-B335-17765D97FD84}"/>
+                <a16:creationId xmlns:a16="http://schemas.microsoft.com/office/drawing/2014/main" id="{60AF168C-54A8-4298-B042-4369B9240701}"/>
               </a:ext>
             </a:extLst>
           </p:cNvPr>
@@ -655,7 +659,7 @@
           <p:cNvPr id="4" name="Date Placeholder 3">
             <a:extLst>
               <a:ext uri="{FF2B5EF4-FFF2-40B4-BE49-F238E27FC236}">
-                <a16:creationId xmlns:a16="http://schemas.microsoft.com/office/drawing/2014/main" id="{2CDBF0B6-E9B2-417F-9E55-29DEA2A777B3}"/>
+                <a16:creationId xmlns:a16="http://schemas.microsoft.com/office/drawing/2014/main" id="{88C2EC16-F39A-495B-9200-E2B1FCFE1623}"/>
               </a:ext>
             </a:extLst>
           </p:cNvPr>
@@ -684,7 +688,7 @@
           <p:cNvPr id="5" name="Footer Placeholder 4">
             <a:extLst>
               <a:ext uri="{FF2B5EF4-FFF2-40B4-BE49-F238E27FC236}">
-                <a16:creationId xmlns:a16="http://schemas.microsoft.com/office/drawing/2014/main" id="{57F024B5-E816-429B-8B87-3832CE797221}"/>
+                <a16:creationId xmlns:a16="http://schemas.microsoft.com/office/drawing/2014/main" id="{D7916082-5631-43E0-8AF7-674302685C22}"/>
               </a:ext>
             </a:extLst>
           </p:cNvPr>
@@ -709,7 +713,7 @@
           <p:cNvPr id="6" name="Slide Number Placeholder 5">
             <a:extLst>
               <a:ext uri="{FF2B5EF4-FFF2-40B4-BE49-F238E27FC236}">
-                <a16:creationId xmlns:a16="http://schemas.microsoft.com/office/drawing/2014/main" id="{6BC1AC3A-ADC2-4643-8DE3-593C193CB2A7}"/>
+                <a16:creationId xmlns:a16="http://schemas.microsoft.com/office/drawing/2014/main" id="{C85D0F58-CDB6-4C6A-BB2B-592B30E6B201}"/>
               </a:ext>
             </a:extLst>
           </p:cNvPr>
@@ -736,7 +740,7 @@
     </p:spTree>
     <p:extLst>
       <p:ext uri="{BB962C8B-B14F-4D97-AF65-F5344CB8AC3E}">
-        <p14:creationId xmlns:p14="http://schemas.microsoft.com/office/powerpoint/2010/main" val="2332507648"/>
+        <p14:creationId xmlns:p14="http://schemas.microsoft.com/office/powerpoint/2010/main" val="832491729"/>
       </p:ext>
     </p:extLst>
   </p:cSld>
@@ -768,7 +772,7 @@
           <p:cNvPr id="2" name="Title 1">
             <a:extLst>
               <a:ext uri="{FF2B5EF4-FFF2-40B4-BE49-F238E27FC236}">
-                <a16:creationId xmlns:a16="http://schemas.microsoft.com/office/drawing/2014/main" id="{1438B815-017D-4347-BA6F-30CCAFF46541}"/>
+                <a16:creationId xmlns:a16="http://schemas.microsoft.com/office/drawing/2014/main" id="{30130984-F312-46FD-9E5C-1FCCA55FB382}"/>
               </a:ext>
             </a:extLst>
           </p:cNvPr>
@@ -796,7 +800,7 @@
           <p:cNvPr id="3" name="Content Placeholder 2">
             <a:extLst>
               <a:ext uri="{FF2B5EF4-FFF2-40B4-BE49-F238E27FC236}">
-                <a16:creationId xmlns:a16="http://schemas.microsoft.com/office/drawing/2014/main" id="{06AAA7E3-770A-4BB0-BB2C-6CD573ED1D13}"/>
+                <a16:creationId xmlns:a16="http://schemas.microsoft.com/office/drawing/2014/main" id="{E7C7FBC1-6B51-4A39-A3A3-10D5AE7CCDA1}"/>
               </a:ext>
             </a:extLst>
           </p:cNvPr>
@@ -853,7 +857,7 @@
           <p:cNvPr id="4" name="Date Placeholder 3">
             <a:extLst>
               <a:ext uri="{FF2B5EF4-FFF2-40B4-BE49-F238E27FC236}">
-                <a16:creationId xmlns:a16="http://schemas.microsoft.com/office/drawing/2014/main" id="{D0A8E91D-409B-4DE1-8D8C-1E224B3BF58F}"/>
+                <a16:creationId xmlns:a16="http://schemas.microsoft.com/office/drawing/2014/main" id="{505B98BF-CAA7-4DCE-80DC-664027102658}"/>
               </a:ext>
             </a:extLst>
           </p:cNvPr>
@@ -882,7 +886,7 @@
           <p:cNvPr id="5" name="Footer Placeholder 4">
             <a:extLst>
               <a:ext uri="{FF2B5EF4-FFF2-40B4-BE49-F238E27FC236}">
-                <a16:creationId xmlns:a16="http://schemas.microsoft.com/office/drawing/2014/main" id="{987365F7-4F97-477B-9C5F-120E7E4B7FEB}"/>
+                <a16:creationId xmlns:a16="http://schemas.microsoft.com/office/drawing/2014/main" id="{D2859B55-0AD9-4110-B964-866EEABB05F3}"/>
               </a:ext>
             </a:extLst>
           </p:cNvPr>
@@ -907,7 +911,7 @@
           <p:cNvPr id="6" name="Slide Number Placeholder 5">
             <a:extLst>
               <a:ext uri="{FF2B5EF4-FFF2-40B4-BE49-F238E27FC236}">
-                <a16:creationId xmlns:a16="http://schemas.microsoft.com/office/drawing/2014/main" id="{7EC41245-1AA9-4FE3-8648-484A805CE6B1}"/>
+                <a16:creationId xmlns:a16="http://schemas.microsoft.com/office/drawing/2014/main" id="{4227C768-8A43-4FC0-9011-96BD8247122D}"/>
               </a:ext>
             </a:extLst>
           </p:cNvPr>
@@ -934,7 +938,7 @@
     </p:spTree>
     <p:extLst>
       <p:ext uri="{BB962C8B-B14F-4D97-AF65-F5344CB8AC3E}">
-        <p14:creationId xmlns:p14="http://schemas.microsoft.com/office/powerpoint/2010/main" val="57534338"/>
+        <p14:creationId xmlns:p14="http://schemas.microsoft.com/office/powerpoint/2010/main" val="691927076"/>
       </p:ext>
     </p:extLst>
   </p:cSld>
@@ -966,7 +970,7 @@
           <p:cNvPr id="2" name="Title 1">
             <a:extLst>
               <a:ext uri="{FF2B5EF4-FFF2-40B4-BE49-F238E27FC236}">
-                <a16:creationId xmlns:a16="http://schemas.microsoft.com/office/drawing/2014/main" id="{B60D547C-162A-4346-B0B3-2402A25BBB38}"/>
+                <a16:creationId xmlns:a16="http://schemas.microsoft.com/office/drawing/2014/main" id="{ECDCC5FA-12DC-460D-B052-802D89A47ED4}"/>
               </a:ext>
             </a:extLst>
           </p:cNvPr>
@@ -1003,7 +1007,7 @@
           <p:cNvPr id="3" name="Text Placeholder 2">
             <a:extLst>
               <a:ext uri="{FF2B5EF4-FFF2-40B4-BE49-F238E27FC236}">
-                <a16:creationId xmlns:a16="http://schemas.microsoft.com/office/drawing/2014/main" id="{C8C6A627-1B16-4BA0-AB7D-44E76BDEC046}"/>
+                <a16:creationId xmlns:a16="http://schemas.microsoft.com/office/drawing/2014/main" id="{32C2E210-0FA8-43BF-887E-556701443007}"/>
               </a:ext>
             </a:extLst>
           </p:cNvPr>
@@ -1128,7 +1132,7 @@
           <p:cNvPr id="4" name="Date Placeholder 3">
             <a:extLst>
               <a:ext uri="{FF2B5EF4-FFF2-40B4-BE49-F238E27FC236}">
-                <a16:creationId xmlns:a16="http://schemas.microsoft.com/office/drawing/2014/main" id="{C572EB3C-3BD3-4AB3-A7CA-CF627749F560}"/>
+                <a16:creationId xmlns:a16="http://schemas.microsoft.com/office/drawing/2014/main" id="{1D1DE55B-9AB8-4338-A2F4-F15B909410B0}"/>
               </a:ext>
             </a:extLst>
           </p:cNvPr>
@@ -1157,7 +1161,7 @@
           <p:cNvPr id="5" name="Footer Placeholder 4">
             <a:extLst>
               <a:ext uri="{FF2B5EF4-FFF2-40B4-BE49-F238E27FC236}">
-                <a16:creationId xmlns:a16="http://schemas.microsoft.com/office/drawing/2014/main" id="{2E6E9534-4B03-49EB-825F-316777D4B512}"/>
+                <a16:creationId xmlns:a16="http://schemas.microsoft.com/office/drawing/2014/main" id="{C291985F-2EF1-498C-B2B3-7D365CD186B4}"/>
               </a:ext>
             </a:extLst>
           </p:cNvPr>
@@ -1182,7 +1186,7 @@
           <p:cNvPr id="6" name="Slide Number Placeholder 5">
             <a:extLst>
               <a:ext uri="{FF2B5EF4-FFF2-40B4-BE49-F238E27FC236}">
-                <a16:creationId xmlns:a16="http://schemas.microsoft.com/office/drawing/2014/main" id="{E7FB6617-B3F0-43C3-B346-C32582A54F53}"/>
+                <a16:creationId xmlns:a16="http://schemas.microsoft.com/office/drawing/2014/main" id="{9A8F2819-CA51-4A2F-BA72-C0CD69DDDFA1}"/>
               </a:ext>
             </a:extLst>
           </p:cNvPr>
@@ -1209,7 +1213,7 @@
     </p:spTree>
     <p:extLst>
       <p:ext uri="{BB962C8B-B14F-4D97-AF65-F5344CB8AC3E}">
-        <p14:creationId xmlns:p14="http://schemas.microsoft.com/office/powerpoint/2010/main" val="1916245695"/>
+        <p14:creationId xmlns:p14="http://schemas.microsoft.com/office/powerpoint/2010/main" val="1049002564"/>
       </p:ext>
     </p:extLst>
   </p:cSld>
@@ -1241,7 +1245,7 @@
           <p:cNvPr id="2" name="Title 1">
             <a:extLst>
               <a:ext uri="{FF2B5EF4-FFF2-40B4-BE49-F238E27FC236}">
-                <a16:creationId xmlns:a16="http://schemas.microsoft.com/office/drawing/2014/main" id="{F109B493-DD4F-4993-A550-91C0D1537D42}"/>
+                <a16:creationId xmlns:a16="http://schemas.microsoft.com/office/drawing/2014/main" id="{397E5BCE-CC2F-4F45-AED9-48C621D33C1D}"/>
               </a:ext>
             </a:extLst>
           </p:cNvPr>
@@ -1269,7 +1273,7 @@
           <p:cNvPr id="3" name="Content Placeholder 2">
             <a:extLst>
               <a:ext uri="{FF2B5EF4-FFF2-40B4-BE49-F238E27FC236}">
-                <a16:creationId xmlns:a16="http://schemas.microsoft.com/office/drawing/2014/main" id="{CD8AEC1C-4593-4247-86B5-BB72120FA378}"/>
+                <a16:creationId xmlns:a16="http://schemas.microsoft.com/office/drawing/2014/main" id="{813C4CBC-348D-43C9-AA32-7E7A66EBAFB7}"/>
               </a:ext>
             </a:extLst>
           </p:cNvPr>
@@ -1331,7 +1335,7 @@
           <p:cNvPr id="4" name="Content Placeholder 3">
             <a:extLst>
               <a:ext uri="{FF2B5EF4-FFF2-40B4-BE49-F238E27FC236}">
-                <a16:creationId xmlns:a16="http://schemas.microsoft.com/office/drawing/2014/main" id="{8943D40F-5D52-4CFA-9532-D705F7BAAF95}"/>
+                <a16:creationId xmlns:a16="http://schemas.microsoft.com/office/drawing/2014/main" id="{DB495210-D771-4F35-9C30-114AD422DCDA}"/>
               </a:ext>
             </a:extLst>
           </p:cNvPr>
@@ -1393,7 +1397,7 @@
           <p:cNvPr id="5" name="Date Placeholder 4">
             <a:extLst>
               <a:ext uri="{FF2B5EF4-FFF2-40B4-BE49-F238E27FC236}">
-                <a16:creationId xmlns:a16="http://schemas.microsoft.com/office/drawing/2014/main" id="{19CF7BF6-1C14-4B70-9CBA-F630CA4E3193}"/>
+                <a16:creationId xmlns:a16="http://schemas.microsoft.com/office/drawing/2014/main" id="{EDA29EBE-3869-4AC9-BB44-219966400124}"/>
               </a:ext>
             </a:extLst>
           </p:cNvPr>
@@ -1422,7 +1426,7 @@
           <p:cNvPr id="6" name="Footer Placeholder 5">
             <a:extLst>
               <a:ext uri="{FF2B5EF4-FFF2-40B4-BE49-F238E27FC236}">
-                <a16:creationId xmlns:a16="http://schemas.microsoft.com/office/drawing/2014/main" id="{99BB9945-DBA9-49A9-BF06-116D6A476B8B}"/>
+                <a16:creationId xmlns:a16="http://schemas.microsoft.com/office/drawing/2014/main" id="{530344B0-ABE7-4A3B-817C-9CD3D2ABC202}"/>
               </a:ext>
             </a:extLst>
           </p:cNvPr>
@@ -1447,7 +1451,7 @@
           <p:cNvPr id="7" name="Slide Number Placeholder 6">
             <a:extLst>
               <a:ext uri="{FF2B5EF4-FFF2-40B4-BE49-F238E27FC236}">
-                <a16:creationId xmlns:a16="http://schemas.microsoft.com/office/drawing/2014/main" id="{D899312F-103B-4A27-91AA-63F49DD45DFF}"/>
+                <a16:creationId xmlns:a16="http://schemas.microsoft.com/office/drawing/2014/main" id="{4B69678A-F6E0-42FA-BF25-29F40C7F972D}"/>
               </a:ext>
             </a:extLst>
           </p:cNvPr>
@@ -1474,7 +1478,7 @@
     </p:spTree>
     <p:extLst>
       <p:ext uri="{BB962C8B-B14F-4D97-AF65-F5344CB8AC3E}">
-        <p14:creationId xmlns:p14="http://schemas.microsoft.com/office/powerpoint/2010/main" val="277875607"/>
+        <p14:creationId xmlns:p14="http://schemas.microsoft.com/office/powerpoint/2010/main" val="3456062658"/>
       </p:ext>
     </p:extLst>
   </p:cSld>
@@ -1506,7 +1510,7 @@
           <p:cNvPr id="2" name="Title 1">
             <a:extLst>
               <a:ext uri="{FF2B5EF4-FFF2-40B4-BE49-F238E27FC236}">
-                <a16:creationId xmlns:a16="http://schemas.microsoft.com/office/drawing/2014/main" id="{80BE2FA9-7F1A-4AC8-9126-3A0BFCB38C2C}"/>
+                <a16:creationId xmlns:a16="http://schemas.microsoft.com/office/drawing/2014/main" id="{FCE6FCDC-EBD2-41F6-89F4-4735749B9C28}"/>
               </a:ext>
             </a:extLst>
           </p:cNvPr>
@@ -1539,7 +1543,7 @@
           <p:cNvPr id="3" name="Text Placeholder 2">
             <a:extLst>
               <a:ext uri="{FF2B5EF4-FFF2-40B4-BE49-F238E27FC236}">
-                <a16:creationId xmlns:a16="http://schemas.microsoft.com/office/drawing/2014/main" id="{0E3E6DB0-DDC4-40AD-B29A-1BC11C60EC25}"/>
+                <a16:creationId xmlns:a16="http://schemas.microsoft.com/office/drawing/2014/main" id="{2C6A7EB5-3FCC-4CB6-83FB-EA1CBC1B7587}"/>
               </a:ext>
             </a:extLst>
           </p:cNvPr>
@@ -1610,7 +1614,7 @@
           <p:cNvPr id="4" name="Content Placeholder 3">
             <a:extLst>
               <a:ext uri="{FF2B5EF4-FFF2-40B4-BE49-F238E27FC236}">
-                <a16:creationId xmlns:a16="http://schemas.microsoft.com/office/drawing/2014/main" id="{9EBF4EA2-9765-466A-94D5-D0304297052E}"/>
+                <a16:creationId xmlns:a16="http://schemas.microsoft.com/office/drawing/2014/main" id="{2AFE4014-9243-4827-B193-E12DAE00E7FA}"/>
               </a:ext>
             </a:extLst>
           </p:cNvPr>
@@ -1672,7 +1676,7 @@
           <p:cNvPr id="5" name="Text Placeholder 4">
             <a:extLst>
               <a:ext uri="{FF2B5EF4-FFF2-40B4-BE49-F238E27FC236}">
-                <a16:creationId xmlns:a16="http://schemas.microsoft.com/office/drawing/2014/main" id="{2173BFA7-8FB6-41C5-9855-3E494623FD4B}"/>
+                <a16:creationId xmlns:a16="http://schemas.microsoft.com/office/drawing/2014/main" id="{8D5BCABB-75A8-4EED-87DB-079C09C8F915}"/>
               </a:ext>
             </a:extLst>
           </p:cNvPr>
@@ -1743,7 +1747,7 @@
           <p:cNvPr id="6" name="Content Placeholder 5">
             <a:extLst>
               <a:ext uri="{FF2B5EF4-FFF2-40B4-BE49-F238E27FC236}">
-                <a16:creationId xmlns:a16="http://schemas.microsoft.com/office/drawing/2014/main" id="{0225B7B9-B99B-40C5-826E-0BCBDF907BE4}"/>
+                <a16:creationId xmlns:a16="http://schemas.microsoft.com/office/drawing/2014/main" id="{2CB3596E-0343-4D9B-8A3C-BFFE620BEE9D}"/>
               </a:ext>
             </a:extLst>
           </p:cNvPr>
@@ -1805,7 +1809,7 @@
           <p:cNvPr id="7" name="Date Placeholder 6">
             <a:extLst>
               <a:ext uri="{FF2B5EF4-FFF2-40B4-BE49-F238E27FC236}">
-                <a16:creationId xmlns:a16="http://schemas.microsoft.com/office/drawing/2014/main" id="{AAC4BB6E-D96D-4745-933E-67185FB4B80A}"/>
+                <a16:creationId xmlns:a16="http://schemas.microsoft.com/office/drawing/2014/main" id="{C222CCA4-0DB7-4464-9A4C-CC0F8F8AF6D2}"/>
               </a:ext>
             </a:extLst>
           </p:cNvPr>
@@ -1834,7 +1838,7 @@
           <p:cNvPr id="8" name="Footer Placeholder 7">
             <a:extLst>
               <a:ext uri="{FF2B5EF4-FFF2-40B4-BE49-F238E27FC236}">
-                <a16:creationId xmlns:a16="http://schemas.microsoft.com/office/drawing/2014/main" id="{23B702C0-0CA9-45CD-AF37-06A37824DAA5}"/>
+                <a16:creationId xmlns:a16="http://schemas.microsoft.com/office/drawing/2014/main" id="{7FF65CFC-9853-4D32-8C75-548F61391F13}"/>
               </a:ext>
             </a:extLst>
           </p:cNvPr>
@@ -1859,7 +1863,7 @@
           <p:cNvPr id="9" name="Slide Number Placeholder 8">
             <a:extLst>
               <a:ext uri="{FF2B5EF4-FFF2-40B4-BE49-F238E27FC236}">
-                <a16:creationId xmlns:a16="http://schemas.microsoft.com/office/drawing/2014/main" id="{C796BD6A-EB63-4BA4-AB8C-F4551D4F8A98}"/>
+                <a16:creationId xmlns:a16="http://schemas.microsoft.com/office/drawing/2014/main" id="{B9AA7647-47F1-48BB-BE7A-403CD21E93EC}"/>
               </a:ext>
             </a:extLst>
           </p:cNvPr>
@@ -1886,7 +1890,7 @@
     </p:spTree>
     <p:extLst>
       <p:ext uri="{BB962C8B-B14F-4D97-AF65-F5344CB8AC3E}">
-        <p14:creationId xmlns:p14="http://schemas.microsoft.com/office/powerpoint/2010/main" val="2691217265"/>
+        <p14:creationId xmlns:p14="http://schemas.microsoft.com/office/powerpoint/2010/main" val="3855690432"/>
       </p:ext>
     </p:extLst>
   </p:cSld>
@@ -1918,7 +1922,7 @@
           <p:cNvPr id="2" name="Title 1">
             <a:extLst>
               <a:ext uri="{FF2B5EF4-FFF2-40B4-BE49-F238E27FC236}">
-                <a16:creationId xmlns:a16="http://schemas.microsoft.com/office/drawing/2014/main" id="{0C246610-E0D1-45E3-8CF0-EF8E71A83CA3}"/>
+                <a16:creationId xmlns:a16="http://schemas.microsoft.com/office/drawing/2014/main" id="{8805B393-D76F-45C0-B3D9-59BD4068C4BE}"/>
               </a:ext>
             </a:extLst>
           </p:cNvPr>
@@ -1946,7 +1950,7 @@
           <p:cNvPr id="3" name="Date Placeholder 2">
             <a:extLst>
               <a:ext uri="{FF2B5EF4-FFF2-40B4-BE49-F238E27FC236}">
-                <a16:creationId xmlns:a16="http://schemas.microsoft.com/office/drawing/2014/main" id="{07D72DA9-A725-4DE2-B26E-EE88EC9FAEFD}"/>
+                <a16:creationId xmlns:a16="http://schemas.microsoft.com/office/drawing/2014/main" id="{8C7E4312-3F2C-4816-8DFA-A9CDE8B3FBBA}"/>
               </a:ext>
             </a:extLst>
           </p:cNvPr>
@@ -1975,7 +1979,7 @@
           <p:cNvPr id="4" name="Footer Placeholder 3">
             <a:extLst>
               <a:ext uri="{FF2B5EF4-FFF2-40B4-BE49-F238E27FC236}">
-                <a16:creationId xmlns:a16="http://schemas.microsoft.com/office/drawing/2014/main" id="{DD3AA7DA-7B22-4A72-AF61-96484CD1B5A7}"/>
+                <a16:creationId xmlns:a16="http://schemas.microsoft.com/office/drawing/2014/main" id="{EEDE61FA-EF38-4714-B532-DC53361A8500}"/>
               </a:ext>
             </a:extLst>
           </p:cNvPr>
@@ -2000,7 +2004,7 @@
           <p:cNvPr id="5" name="Slide Number Placeholder 4">
             <a:extLst>
               <a:ext uri="{FF2B5EF4-FFF2-40B4-BE49-F238E27FC236}">
-                <a16:creationId xmlns:a16="http://schemas.microsoft.com/office/drawing/2014/main" id="{C0DD2981-9CF6-430C-AA04-D5D8B5289A02}"/>
+                <a16:creationId xmlns:a16="http://schemas.microsoft.com/office/drawing/2014/main" id="{2BEE6397-BB1E-4294-8040-3A174CCE7D55}"/>
               </a:ext>
             </a:extLst>
           </p:cNvPr>
@@ -2027,7 +2031,7 @@
     </p:spTree>
     <p:extLst>
       <p:ext uri="{BB962C8B-B14F-4D97-AF65-F5344CB8AC3E}">
-        <p14:creationId xmlns:p14="http://schemas.microsoft.com/office/powerpoint/2010/main" val="4166822502"/>
+        <p14:creationId xmlns:p14="http://schemas.microsoft.com/office/powerpoint/2010/main" val="859195364"/>
       </p:ext>
     </p:extLst>
   </p:cSld>
@@ -2059,7 +2063,7 @@
           <p:cNvPr id="2" name="Date Placeholder 1">
             <a:extLst>
               <a:ext uri="{FF2B5EF4-FFF2-40B4-BE49-F238E27FC236}">
-                <a16:creationId xmlns:a16="http://schemas.microsoft.com/office/drawing/2014/main" id="{0962B3EB-55A0-4F33-BDD0-C40C40E3EC48}"/>
+                <a16:creationId xmlns:a16="http://schemas.microsoft.com/office/drawing/2014/main" id="{A23B8361-4AD7-44E9-BF72-77D7D509683C}"/>
               </a:ext>
             </a:extLst>
           </p:cNvPr>
@@ -2088,7 +2092,7 @@
           <p:cNvPr id="3" name="Footer Placeholder 2">
             <a:extLst>
               <a:ext uri="{FF2B5EF4-FFF2-40B4-BE49-F238E27FC236}">
-                <a16:creationId xmlns:a16="http://schemas.microsoft.com/office/drawing/2014/main" id="{AD3ECCBA-CF32-41D9-AEB2-FDB22A3B63AF}"/>
+                <a16:creationId xmlns:a16="http://schemas.microsoft.com/office/drawing/2014/main" id="{126F9269-189D-4449-B093-F7859E383B52}"/>
               </a:ext>
             </a:extLst>
           </p:cNvPr>
@@ -2113,7 +2117,7 @@
           <p:cNvPr id="4" name="Slide Number Placeholder 3">
             <a:extLst>
               <a:ext uri="{FF2B5EF4-FFF2-40B4-BE49-F238E27FC236}">
-                <a16:creationId xmlns:a16="http://schemas.microsoft.com/office/drawing/2014/main" id="{C1E3BDA2-845C-4FCE-BBE3-359219452FE6}"/>
+                <a16:creationId xmlns:a16="http://schemas.microsoft.com/office/drawing/2014/main" id="{DEE65DFB-826B-4F6A-9023-FF6D93A8D580}"/>
               </a:ext>
             </a:extLst>
           </p:cNvPr>
@@ -2140,7 +2144,7 @@
     </p:spTree>
     <p:extLst>
       <p:ext uri="{BB962C8B-B14F-4D97-AF65-F5344CB8AC3E}">
-        <p14:creationId xmlns:p14="http://schemas.microsoft.com/office/powerpoint/2010/main" val="716012471"/>
+        <p14:creationId xmlns:p14="http://schemas.microsoft.com/office/powerpoint/2010/main" val="4020144573"/>
       </p:ext>
     </p:extLst>
   </p:cSld>
@@ -2172,7 +2176,7 @@
           <p:cNvPr id="2" name="Title 1">
             <a:extLst>
               <a:ext uri="{FF2B5EF4-FFF2-40B4-BE49-F238E27FC236}">
-                <a16:creationId xmlns:a16="http://schemas.microsoft.com/office/drawing/2014/main" id="{40A13530-C25B-430A-A631-190589447724}"/>
+                <a16:creationId xmlns:a16="http://schemas.microsoft.com/office/drawing/2014/main" id="{3EC29430-5131-4FF2-9A89-E8A031583C83}"/>
               </a:ext>
             </a:extLst>
           </p:cNvPr>
@@ -2209,7 +2213,7 @@
           <p:cNvPr id="3" name="Content Placeholder 2">
             <a:extLst>
               <a:ext uri="{FF2B5EF4-FFF2-40B4-BE49-F238E27FC236}">
-                <a16:creationId xmlns:a16="http://schemas.microsoft.com/office/drawing/2014/main" id="{0F50FC32-5BCB-423C-BE2D-ABA0ECA39865}"/>
+                <a16:creationId xmlns:a16="http://schemas.microsoft.com/office/drawing/2014/main" id="{5B809BB6-79AB-42B0-B179-A0AFC5F9513D}"/>
               </a:ext>
             </a:extLst>
           </p:cNvPr>
@@ -2299,7 +2303,7 @@
           <p:cNvPr id="4" name="Text Placeholder 3">
             <a:extLst>
               <a:ext uri="{FF2B5EF4-FFF2-40B4-BE49-F238E27FC236}">
-                <a16:creationId xmlns:a16="http://schemas.microsoft.com/office/drawing/2014/main" id="{264B1791-8454-4F66-8BDA-60BE3EC494B3}"/>
+                <a16:creationId xmlns:a16="http://schemas.microsoft.com/office/drawing/2014/main" id="{9AFE9EAB-85DC-4CE8-AF52-05E30C3A82CC}"/>
               </a:ext>
             </a:extLst>
           </p:cNvPr>
@@ -2370,7 +2374,7 @@
           <p:cNvPr id="5" name="Date Placeholder 4">
             <a:extLst>
               <a:ext uri="{FF2B5EF4-FFF2-40B4-BE49-F238E27FC236}">
-                <a16:creationId xmlns:a16="http://schemas.microsoft.com/office/drawing/2014/main" id="{381A5B54-4689-456D-9D60-6B1029609D2B}"/>
+                <a16:creationId xmlns:a16="http://schemas.microsoft.com/office/drawing/2014/main" id="{1058EB5F-7A19-4B42-BC77-86AD7C09E241}"/>
               </a:ext>
             </a:extLst>
           </p:cNvPr>
@@ -2399,7 +2403,7 @@
           <p:cNvPr id="6" name="Footer Placeholder 5">
             <a:extLst>
               <a:ext uri="{FF2B5EF4-FFF2-40B4-BE49-F238E27FC236}">
-                <a16:creationId xmlns:a16="http://schemas.microsoft.com/office/drawing/2014/main" id="{AF904360-DD36-4A5E-8904-1EC83B923330}"/>
+                <a16:creationId xmlns:a16="http://schemas.microsoft.com/office/drawing/2014/main" id="{668441D5-BE43-41F7-88C5-45FF7A442D9C}"/>
               </a:ext>
             </a:extLst>
           </p:cNvPr>
@@ -2424,7 +2428,7 @@
           <p:cNvPr id="7" name="Slide Number Placeholder 6">
             <a:extLst>
               <a:ext uri="{FF2B5EF4-FFF2-40B4-BE49-F238E27FC236}">
-                <a16:creationId xmlns:a16="http://schemas.microsoft.com/office/drawing/2014/main" id="{1F445FB1-BEA7-4008-B70E-8E76459E4913}"/>
+                <a16:creationId xmlns:a16="http://schemas.microsoft.com/office/drawing/2014/main" id="{108544B0-9CF4-4FEC-AB3F-5455B6E997AA}"/>
               </a:ext>
             </a:extLst>
           </p:cNvPr>
@@ -2451,7 +2455,7 @@
     </p:spTree>
     <p:extLst>
       <p:ext uri="{BB962C8B-B14F-4D97-AF65-F5344CB8AC3E}">
-        <p14:creationId xmlns:p14="http://schemas.microsoft.com/office/powerpoint/2010/main" val="398790436"/>
+        <p14:creationId xmlns:p14="http://schemas.microsoft.com/office/powerpoint/2010/main" val="842268424"/>
       </p:ext>
     </p:extLst>
   </p:cSld>
@@ -2483,7 +2487,7 @@
           <p:cNvPr id="2" name="Title 1">
             <a:extLst>
               <a:ext uri="{FF2B5EF4-FFF2-40B4-BE49-F238E27FC236}">
-                <a16:creationId xmlns:a16="http://schemas.microsoft.com/office/drawing/2014/main" id="{EA3ADB7D-ECBD-4F39-9D54-62E0C946FCF4}"/>
+                <a16:creationId xmlns:a16="http://schemas.microsoft.com/office/drawing/2014/main" id="{DC13529C-C1FB-4C29-84B7-41F39EB01650}"/>
               </a:ext>
             </a:extLst>
           </p:cNvPr>
@@ -2520,7 +2524,7 @@
           <p:cNvPr id="3" name="Picture Placeholder 2">
             <a:extLst>
               <a:ext uri="{FF2B5EF4-FFF2-40B4-BE49-F238E27FC236}">
-                <a16:creationId xmlns:a16="http://schemas.microsoft.com/office/drawing/2014/main" id="{D0704ED1-9A99-40C9-8134-F38DF7B3399C}"/>
+                <a16:creationId xmlns:a16="http://schemas.microsoft.com/office/drawing/2014/main" id="{A757F079-07F4-4448-9391-AC51882E14E2}"/>
               </a:ext>
             </a:extLst>
           </p:cNvPr>
@@ -2587,7 +2591,7 @@
           <p:cNvPr id="4" name="Text Placeholder 3">
             <a:extLst>
               <a:ext uri="{FF2B5EF4-FFF2-40B4-BE49-F238E27FC236}">
-                <a16:creationId xmlns:a16="http://schemas.microsoft.com/office/drawing/2014/main" id="{474915C2-19C6-4D3B-A7C6-7200A844A85A}"/>
+                <a16:creationId xmlns:a16="http://schemas.microsoft.com/office/drawing/2014/main" id="{B24489EE-AB87-460A-96E9-1A2700FF4A45}"/>
               </a:ext>
             </a:extLst>
           </p:cNvPr>
@@ -2658,7 +2662,7 @@
           <p:cNvPr id="5" name="Date Placeholder 4">
             <a:extLst>
               <a:ext uri="{FF2B5EF4-FFF2-40B4-BE49-F238E27FC236}">
-                <a16:creationId xmlns:a16="http://schemas.microsoft.com/office/drawing/2014/main" id="{25B6BEE4-FB29-4BEE-BB18-3BC81F67C015}"/>
+                <a16:creationId xmlns:a16="http://schemas.microsoft.com/office/drawing/2014/main" id="{214BB907-6752-4AFB-97CF-3E9E3C0FDC3F}"/>
               </a:ext>
             </a:extLst>
           </p:cNvPr>
@@ -2687,7 +2691,7 @@
           <p:cNvPr id="6" name="Footer Placeholder 5">
             <a:extLst>
               <a:ext uri="{FF2B5EF4-FFF2-40B4-BE49-F238E27FC236}">
-                <a16:creationId xmlns:a16="http://schemas.microsoft.com/office/drawing/2014/main" id="{7533EA2C-ECFD-4432-BE24-6609D32F4672}"/>
+                <a16:creationId xmlns:a16="http://schemas.microsoft.com/office/drawing/2014/main" id="{6EF90D70-1548-425F-8123-80E311BA502D}"/>
               </a:ext>
             </a:extLst>
           </p:cNvPr>
@@ -2712,7 +2716,7 @@
           <p:cNvPr id="7" name="Slide Number Placeholder 6">
             <a:extLst>
               <a:ext uri="{FF2B5EF4-FFF2-40B4-BE49-F238E27FC236}">
-                <a16:creationId xmlns:a16="http://schemas.microsoft.com/office/drawing/2014/main" id="{87EDA447-D6FD-4233-B273-AAFD6B1D0EC5}"/>
+                <a16:creationId xmlns:a16="http://schemas.microsoft.com/office/drawing/2014/main" id="{8F6DF02D-EE8C-480A-B240-F7C77A163B83}"/>
               </a:ext>
             </a:extLst>
           </p:cNvPr>
@@ -2739,7 +2743,7 @@
     </p:spTree>
     <p:extLst>
       <p:ext uri="{BB962C8B-B14F-4D97-AF65-F5344CB8AC3E}">
-        <p14:creationId xmlns:p14="http://schemas.microsoft.com/office/powerpoint/2010/main" val="205632521"/>
+        <p14:creationId xmlns:p14="http://schemas.microsoft.com/office/powerpoint/2010/main" val="1551502316"/>
       </p:ext>
     </p:extLst>
   </p:cSld>
@@ -2776,7 +2780,7 @@
           <p:cNvPr id="2" name="Title Placeholder 1">
             <a:extLst>
               <a:ext uri="{FF2B5EF4-FFF2-40B4-BE49-F238E27FC236}">
-                <a16:creationId xmlns:a16="http://schemas.microsoft.com/office/drawing/2014/main" id="{C75B7270-30E0-4E23-A5C5-1B488ADFCFBB}"/>
+                <a16:creationId xmlns:a16="http://schemas.microsoft.com/office/drawing/2014/main" id="{39B8702C-5A5B-48E8-8212-0FBDD7797710}"/>
               </a:ext>
             </a:extLst>
           </p:cNvPr>
@@ -2814,7 +2818,7 @@
           <p:cNvPr id="3" name="Text Placeholder 2">
             <a:extLst>
               <a:ext uri="{FF2B5EF4-FFF2-40B4-BE49-F238E27FC236}">
-                <a16:creationId xmlns:a16="http://schemas.microsoft.com/office/drawing/2014/main" id="{6AD0E180-0198-45A4-B6EA-4AC791B42BE9}"/>
+                <a16:creationId xmlns:a16="http://schemas.microsoft.com/office/drawing/2014/main" id="{41B80E31-6787-45C0-92B3-B8A0A278DF40}"/>
               </a:ext>
             </a:extLst>
           </p:cNvPr>
@@ -2881,7 +2885,7 @@
           <p:cNvPr id="4" name="Date Placeholder 3">
             <a:extLst>
               <a:ext uri="{FF2B5EF4-FFF2-40B4-BE49-F238E27FC236}">
-                <a16:creationId xmlns:a16="http://schemas.microsoft.com/office/drawing/2014/main" id="{E6B799B5-A6C3-418B-B7A7-495AA39669A2}"/>
+                <a16:creationId xmlns:a16="http://schemas.microsoft.com/office/drawing/2014/main" id="{9F9E4A51-35F6-48F4-BB5A-33425F937D11}"/>
               </a:ext>
             </a:extLst>
           </p:cNvPr>
@@ -2928,7 +2932,7 @@
           <p:cNvPr id="5" name="Footer Placeholder 4">
             <a:extLst>
               <a:ext uri="{FF2B5EF4-FFF2-40B4-BE49-F238E27FC236}">
-                <a16:creationId xmlns:a16="http://schemas.microsoft.com/office/drawing/2014/main" id="{94520C80-7E3C-40F2-8404-F5D37B5815F2}"/>
+                <a16:creationId xmlns:a16="http://schemas.microsoft.com/office/drawing/2014/main" id="{E736A1B8-3020-4865-BF24-291483909767}"/>
               </a:ext>
             </a:extLst>
           </p:cNvPr>
@@ -2971,7 +2975,7 @@
           <p:cNvPr id="6" name="Slide Number Placeholder 5">
             <a:extLst>
               <a:ext uri="{FF2B5EF4-FFF2-40B4-BE49-F238E27FC236}">
-                <a16:creationId xmlns:a16="http://schemas.microsoft.com/office/drawing/2014/main" id="{9E565DAD-D288-4008-9FB8-3F11C397886D}"/>
+                <a16:creationId xmlns:a16="http://schemas.microsoft.com/office/drawing/2014/main" id="{A6C6FE8C-D8BA-457E-B1C0-563FAF8F7C75}"/>
               </a:ext>
             </a:extLst>
           </p:cNvPr>
@@ -3016,23 +3020,23 @@
     </p:spTree>
     <p:extLst>
       <p:ext uri="{BB962C8B-B14F-4D97-AF65-F5344CB8AC3E}">
-        <p14:creationId xmlns:p14="http://schemas.microsoft.com/office/powerpoint/2010/main" val="221595458"/>
+        <p14:creationId xmlns:p14="http://schemas.microsoft.com/office/powerpoint/2010/main" val="186293525"/>
       </p:ext>
     </p:extLst>
   </p:cSld>
   <p:clrMap bg1="lt1" tx1="dk1" bg2="lt2" tx2="dk2" accent1="accent1" accent2="accent2" accent3="accent3" accent4="accent4" accent5="accent5" accent6="accent6" hlink="hlink" folHlink="folHlink"/>
   <p:sldLayoutIdLst>
-    <p:sldLayoutId id="2147483649" r:id="rId1"/>
-    <p:sldLayoutId id="2147483650" r:id="rId2"/>
-    <p:sldLayoutId id="2147483651" r:id="rId3"/>
-    <p:sldLayoutId id="2147483652" r:id="rId4"/>
-    <p:sldLayoutId id="2147483653" r:id="rId5"/>
-    <p:sldLayoutId id="2147483654" r:id="rId6"/>
-    <p:sldLayoutId id="2147483655" r:id="rId7"/>
-    <p:sldLayoutId id="2147483656" r:id="rId8"/>
-    <p:sldLayoutId id="2147483657" r:id="rId9"/>
-    <p:sldLayoutId id="2147483658" r:id="rId10"/>
-    <p:sldLayoutId id="2147483659" r:id="rId11"/>
+    <p:sldLayoutId id="2147483751" r:id="rId1"/>
+    <p:sldLayoutId id="2147483752" r:id="rId2"/>
+    <p:sldLayoutId id="2147483753" r:id="rId3"/>
+    <p:sldLayoutId id="2147483754" r:id="rId4"/>
+    <p:sldLayoutId id="2147483755" r:id="rId5"/>
+    <p:sldLayoutId id="2147483756" r:id="rId6"/>
+    <p:sldLayoutId id="2147483757" r:id="rId7"/>
+    <p:sldLayoutId id="2147483758" r:id="rId8"/>
+    <p:sldLayoutId id="2147483759" r:id="rId9"/>
+    <p:sldLayoutId id="2147483760" r:id="rId10"/>
+    <p:sldLayoutId id="2147483761" r:id="rId11"/>
   </p:sldLayoutIdLst>
   <p:txStyles>
     <p:titleStyle>
@@ -3407,6 +3411,375 @@
 </p:sld>
 </file>
 
+<file path=ppt/slides/slide10.xml><?xml version="1.0" encoding="utf-8"?>
+<p:sld xmlns:a="http://schemas.openxmlformats.org/drawingml/2006/main" xmlns:r="http://schemas.openxmlformats.org/officeDocument/2006/relationships" xmlns:p="http://schemas.openxmlformats.org/presentationml/2006/main">
+  <p:cSld>
+    <p:spTree>
+      <p:nvGrpSpPr>
+        <p:cNvPr id="1" name=""/>
+        <p:cNvGrpSpPr/>
+        <p:nvPr/>
+      </p:nvGrpSpPr>
+      <p:grpSpPr>
+        <a:xfrm>
+          <a:off x="0" y="0"/>
+          <a:ext cx="0" cy="0"/>
+          <a:chOff x="0" y="0"/>
+          <a:chExt cx="0" cy="0"/>
+        </a:xfrm>
+      </p:grpSpPr>
+      <p:sp>
+        <p:nvSpPr>
+          <p:cNvPr id="2" name="Title 1">
+            <a:extLst>
+              <a:ext uri="{FF2B5EF4-FFF2-40B4-BE49-F238E27FC236}">
+                <a16:creationId xmlns:a16="http://schemas.microsoft.com/office/drawing/2014/main" id="{2992DC2A-CCC0-4DDF-B19A-2BEAB5D1B31F}"/>
+              </a:ext>
+            </a:extLst>
+          </p:cNvPr>
+          <p:cNvSpPr>
+            <a:spLocks noGrp="1"/>
+          </p:cNvSpPr>
+          <p:nvPr>
+            <p:ph type="title"/>
+          </p:nvPr>
+        </p:nvSpPr>
+        <p:spPr/>
+        <p:txBody>
+          <a:bodyPr/>
+          <a:lstStyle/>
+          <a:p>
+            <a:r>
+              <a:rPr lang="en-US" dirty="0"/>
+              <a:t>Plugins - HTTP</a:t>
+            </a:r>
+          </a:p>
+        </p:txBody>
+      </p:sp>
+      <p:sp>
+        <p:nvSpPr>
+          <p:cNvPr id="3" name="Content Placeholder 2">
+            <a:extLst>
+              <a:ext uri="{FF2B5EF4-FFF2-40B4-BE49-F238E27FC236}">
+                <a16:creationId xmlns:a16="http://schemas.microsoft.com/office/drawing/2014/main" id="{45137290-7580-449C-9150-D7A67C7671E7}"/>
+              </a:ext>
+            </a:extLst>
+          </p:cNvPr>
+          <p:cNvSpPr>
+            <a:spLocks noGrp="1"/>
+          </p:cNvSpPr>
+          <p:nvPr>
+            <p:ph idx="1"/>
+          </p:nvPr>
+        </p:nvSpPr>
+        <p:spPr/>
+        <p:txBody>
+          <a:bodyPr/>
+          <a:lstStyle/>
+          <a:p>
+            <a:endParaRPr lang="en-US"/>
+          </a:p>
+        </p:txBody>
+      </p:sp>
+    </p:spTree>
+    <p:extLst>
+      <p:ext uri="{BB962C8B-B14F-4D97-AF65-F5344CB8AC3E}">
+        <p14:creationId xmlns:p14="http://schemas.microsoft.com/office/powerpoint/2010/main" val="3630723733"/>
+      </p:ext>
+    </p:extLst>
+  </p:cSld>
+  <p:clrMapOvr>
+    <a:masterClrMapping/>
+  </p:clrMapOvr>
+</p:sld>
+</file>
+
+<file path=ppt/slides/slide11.xml><?xml version="1.0" encoding="utf-8"?>
+<p:sld xmlns:a="http://schemas.openxmlformats.org/drawingml/2006/main" xmlns:r="http://schemas.openxmlformats.org/officeDocument/2006/relationships" xmlns:p="http://schemas.openxmlformats.org/presentationml/2006/main">
+  <p:cSld>
+    <p:spTree>
+      <p:nvGrpSpPr>
+        <p:cNvPr id="1" name=""/>
+        <p:cNvGrpSpPr/>
+        <p:nvPr/>
+      </p:nvGrpSpPr>
+      <p:grpSpPr>
+        <a:xfrm>
+          <a:off x="0" y="0"/>
+          <a:ext cx="0" cy="0"/>
+          <a:chOff x="0" y="0"/>
+          <a:chExt cx="0" cy="0"/>
+        </a:xfrm>
+      </p:grpSpPr>
+      <p:sp>
+        <p:nvSpPr>
+          <p:cNvPr id="2" name="Title 1">
+            <a:extLst>
+              <a:ext uri="{FF2B5EF4-FFF2-40B4-BE49-F238E27FC236}">
+                <a16:creationId xmlns:a16="http://schemas.microsoft.com/office/drawing/2014/main" id="{D376FDDC-1A24-473C-A8EC-457BCA5BD593}"/>
+              </a:ext>
+            </a:extLst>
+          </p:cNvPr>
+          <p:cNvSpPr>
+            <a:spLocks noGrp="1"/>
+          </p:cNvSpPr>
+          <p:nvPr>
+            <p:ph type="title"/>
+          </p:nvPr>
+        </p:nvSpPr>
+        <p:spPr/>
+        <p:txBody>
+          <a:bodyPr/>
+          <a:lstStyle/>
+          <a:p>
+            <a:r>
+              <a:rPr lang="en-US" dirty="0"/>
+              <a:t>SSH and </a:t>
+            </a:r>
+            <a:r>
+              <a:rPr lang="en-US" dirty="0" err="1"/>
+              <a:t>WinRM</a:t>
+            </a:r>
+            <a:r>
+              <a:rPr lang="en-US" dirty="0"/>
+              <a:t> Plugins and </a:t>
+            </a:r>
+            <a:r>
+              <a:rPr lang="en-US" dirty="0" err="1"/>
+              <a:t>RemoteClient</a:t>
+            </a:r>
+            <a:endParaRPr lang="en-US" dirty="0"/>
+          </a:p>
+        </p:txBody>
+      </p:sp>
+      <p:sp>
+        <p:nvSpPr>
+          <p:cNvPr id="3" name="Content Placeholder 2">
+            <a:extLst>
+              <a:ext uri="{FF2B5EF4-FFF2-40B4-BE49-F238E27FC236}">
+                <a16:creationId xmlns:a16="http://schemas.microsoft.com/office/drawing/2014/main" id="{F5E0B828-64EE-4736-88D7-93D8B49E1B98}"/>
+              </a:ext>
+            </a:extLst>
+          </p:cNvPr>
+          <p:cNvSpPr>
+            <a:spLocks noGrp="1"/>
+          </p:cNvSpPr>
+          <p:nvPr>
+            <p:ph idx="1"/>
+          </p:nvPr>
+        </p:nvSpPr>
+        <p:spPr/>
+        <p:txBody>
+          <a:bodyPr/>
+          <a:lstStyle/>
+          <a:p>
+            <a:endParaRPr lang="en-US"/>
+          </a:p>
+        </p:txBody>
+      </p:sp>
+    </p:spTree>
+    <p:extLst>
+      <p:ext uri="{BB962C8B-B14F-4D97-AF65-F5344CB8AC3E}">
+        <p14:creationId xmlns:p14="http://schemas.microsoft.com/office/powerpoint/2010/main" val="3723179897"/>
+      </p:ext>
+    </p:extLst>
+  </p:cSld>
+  <p:clrMapOvr>
+    <a:masterClrMapping/>
+  </p:clrMapOvr>
+</p:sld>
+</file>
+
+<file path=ppt/slides/slide12.xml><?xml version="1.0" encoding="utf-8"?>
+<p:sld xmlns:a="http://schemas.openxmlformats.org/drawingml/2006/main" xmlns:r="http://schemas.openxmlformats.org/officeDocument/2006/relationships" xmlns:p="http://schemas.openxmlformats.org/presentationml/2006/main">
+  <p:cSld>
+    <p:spTree>
+      <p:nvGrpSpPr>
+        <p:cNvPr id="1" name=""/>
+        <p:cNvGrpSpPr/>
+        <p:nvPr/>
+      </p:nvGrpSpPr>
+      <p:grpSpPr>
+        <a:xfrm>
+          <a:off x="0" y="0"/>
+          <a:ext cx="0" cy="0"/>
+          <a:chOff x="0" y="0"/>
+          <a:chExt cx="0" cy="0"/>
+        </a:xfrm>
+      </p:grpSpPr>
+      <p:sp>
+        <p:nvSpPr>
+          <p:cNvPr id="2" name="Title 1">
+            <a:extLst>
+              <a:ext uri="{FF2B5EF4-FFF2-40B4-BE49-F238E27FC236}">
+                <a16:creationId xmlns:a16="http://schemas.microsoft.com/office/drawing/2014/main" id="{6DABA4AA-E7A7-44E9-97E6-41E63241618B}"/>
+              </a:ext>
+            </a:extLst>
+          </p:cNvPr>
+          <p:cNvSpPr>
+            <a:spLocks noGrp="1"/>
+          </p:cNvSpPr>
+          <p:nvPr>
+            <p:ph type="title"/>
+          </p:nvPr>
+        </p:nvSpPr>
+        <p:spPr/>
+        <p:txBody>
+          <a:bodyPr/>
+          <a:lstStyle/>
+          <a:p>
+            <a:r>
+              <a:rPr lang="en-US" dirty="0"/>
+              <a:t>Base </a:t>
+            </a:r>
+            <a:r>
+              <a:rPr lang="en-US" dirty="0" err="1"/>
+              <a:t>unittest</a:t>
+            </a:r>
+            <a:r>
+              <a:rPr lang="en-US" dirty="0"/>
+              <a:t> Fixture</a:t>
+            </a:r>
+          </a:p>
+        </p:txBody>
+      </p:sp>
+      <p:sp>
+        <p:nvSpPr>
+          <p:cNvPr id="3" name="Content Placeholder 2">
+            <a:extLst>
+              <a:ext uri="{FF2B5EF4-FFF2-40B4-BE49-F238E27FC236}">
+                <a16:creationId xmlns:a16="http://schemas.microsoft.com/office/drawing/2014/main" id="{F0ECB881-FC2E-4F76-A127-CC4505146090}"/>
+              </a:ext>
+            </a:extLst>
+          </p:cNvPr>
+          <p:cNvSpPr>
+            <a:spLocks noGrp="1"/>
+          </p:cNvSpPr>
+          <p:nvPr>
+            <p:ph idx="1"/>
+          </p:nvPr>
+        </p:nvSpPr>
+        <p:spPr/>
+        <p:txBody>
+          <a:bodyPr/>
+          <a:lstStyle/>
+          <a:p>
+            <a:r>
+              <a:rPr lang="en-US" dirty="0"/>
+              <a:t>Sets up logging</a:t>
+            </a:r>
+          </a:p>
+          <a:p>
+            <a:r>
+              <a:rPr lang="en-US" dirty="0"/>
+              <a:t>Your tests need to have this class in their inheritance chain for logging to work correctly</a:t>
+            </a:r>
+          </a:p>
+          <a:p>
+            <a:r>
+              <a:rPr lang="en-US" dirty="0" err="1"/>
+              <a:t>AddClassCleanup</a:t>
+            </a:r>
+            <a:endParaRPr lang="en-US" dirty="0"/>
+          </a:p>
+        </p:txBody>
+      </p:sp>
+    </p:spTree>
+    <p:extLst>
+      <p:ext uri="{BB962C8B-B14F-4D97-AF65-F5344CB8AC3E}">
+        <p14:creationId xmlns:p14="http://schemas.microsoft.com/office/powerpoint/2010/main" val="3867521529"/>
+      </p:ext>
+    </p:extLst>
+  </p:cSld>
+  <p:clrMapOvr>
+    <a:masterClrMapping/>
+  </p:clrMapOvr>
+</p:sld>
+</file>
+
+<file path=ppt/slides/slide13.xml><?xml version="1.0" encoding="utf-8"?>
+<p:sld xmlns:a="http://schemas.openxmlformats.org/drawingml/2006/main" xmlns:r="http://schemas.openxmlformats.org/officeDocument/2006/relationships" xmlns:p="http://schemas.openxmlformats.org/presentationml/2006/main">
+  <p:cSld>
+    <p:spTree>
+      <p:nvGrpSpPr>
+        <p:cNvPr id="1" name=""/>
+        <p:cNvGrpSpPr/>
+        <p:nvPr/>
+      </p:nvGrpSpPr>
+      <p:grpSpPr>
+        <a:xfrm>
+          <a:off x="0" y="0"/>
+          <a:ext cx="0" cy="0"/>
+          <a:chOff x="0" y="0"/>
+          <a:chExt cx="0" cy="0"/>
+        </a:xfrm>
+      </p:grpSpPr>
+      <p:sp>
+        <p:nvSpPr>
+          <p:cNvPr id="2" name="Title 1">
+            <a:extLst>
+              <a:ext uri="{FF2B5EF4-FFF2-40B4-BE49-F238E27FC236}">
+                <a16:creationId xmlns:a16="http://schemas.microsoft.com/office/drawing/2014/main" id="{6F5DE362-7075-4E99-B42D-9004D4AB14CF}"/>
+              </a:ext>
+            </a:extLst>
+          </p:cNvPr>
+          <p:cNvSpPr>
+            <a:spLocks noGrp="1"/>
+          </p:cNvSpPr>
+          <p:nvPr>
+            <p:ph type="title"/>
+          </p:nvPr>
+        </p:nvSpPr>
+        <p:spPr/>
+        <p:txBody>
+          <a:bodyPr/>
+          <a:lstStyle/>
+          <a:p>
+            <a:r>
+              <a:rPr lang="en-US"/>
+              <a:t>Links</a:t>
+            </a:r>
+          </a:p>
+        </p:txBody>
+      </p:sp>
+      <p:sp>
+        <p:nvSpPr>
+          <p:cNvPr id="3" name="Content Placeholder 2">
+            <a:extLst>
+              <a:ext uri="{FF2B5EF4-FFF2-40B4-BE49-F238E27FC236}">
+                <a16:creationId xmlns:a16="http://schemas.microsoft.com/office/drawing/2014/main" id="{7CEEE340-5009-4954-997B-CBCB102ED7E3}"/>
+              </a:ext>
+            </a:extLst>
+          </p:cNvPr>
+          <p:cNvSpPr>
+            <a:spLocks noGrp="1"/>
+          </p:cNvSpPr>
+          <p:nvPr>
+            <p:ph idx="1"/>
+          </p:nvPr>
+        </p:nvSpPr>
+        <p:spPr/>
+        <p:txBody>
+          <a:bodyPr/>
+          <a:lstStyle/>
+          <a:p>
+            <a:endParaRPr lang="en-US"/>
+          </a:p>
+        </p:txBody>
+      </p:sp>
+    </p:spTree>
+    <p:extLst>
+      <p:ext uri="{BB962C8B-B14F-4D97-AF65-F5344CB8AC3E}">
+        <p14:creationId xmlns:p14="http://schemas.microsoft.com/office/powerpoint/2010/main" val="2424295638"/>
+      </p:ext>
+    </p:extLst>
+  </p:cSld>
+  <p:clrMapOvr>
+    <a:masterClrMapping/>
+  </p:clrMapOvr>
+</p:sld>
+</file>
+
 <file path=ppt/slides/slide2.xml><?xml version="1.0" encoding="utf-8"?>
 <p:sld xmlns:a="http://schemas.openxmlformats.org/drawingml/2006/main" xmlns:r="http://schemas.openxmlformats.org/officeDocument/2006/relationships" xmlns:p="http://schemas.openxmlformats.org/presentationml/2006/main">
   <p:cSld>
@@ -3671,17 +4044,10 @@
           <a:lstStyle/>
           <a:p>
             <a:r>
-              <a:rPr lang="en-US" dirty="0"/>
-              <a:t>Core </a:t>
-            </a:r>
-            <a:r>
-              <a:rPr lang="en-US" dirty="0" err="1"/>
-              <a:t>OpenCafe</a:t>
-            </a:r>
-            <a:r>
-              <a:rPr lang="en-US" dirty="0"/>
-              <a:t> Projects</a:t>
-            </a:r>
+              <a:rPr lang="en-US"/>
+              <a:t>Core OpenCafe Projects</a:t>
+            </a:r>
+            <a:endParaRPr lang="en-US" dirty="0"/>
           </a:p>
         </p:txBody>
       </p:sp>
@@ -3887,6 +4253,17 @@
               <a:t> file structure</a:t>
             </a:r>
           </a:p>
+          <a:p>
+            <a:r>
+              <a:rPr lang="en-US" dirty="0"/>
+              <a:t>Show </a:t>
+            </a:r>
+            <a:r>
+              <a:rPr lang="en-US" dirty="0" err="1"/>
+              <a:t>engine.config</a:t>
+            </a:r>
+            <a:endParaRPr lang="en-US" dirty="0"/>
+          </a:p>
         </p:txBody>
       </p:sp>
     </p:spTree>
@@ -3941,8 +4318,12 @@
           <a:lstStyle/>
           <a:p>
             <a:r>
-              <a:rPr lang="en-US" dirty="0"/>
-              <a:t>Client Terminology</a:t>
+              <a:rPr lang="en-US" dirty="0" err="1"/>
+              <a:t>OpenCafe</a:t>
+            </a:r>
+            <a:r>
+              <a:rPr lang="en-US" dirty="0"/>
+              <a:t> Terminology</a:t>
             </a:r>
           </a:p>
         </p:txBody>
@@ -3965,7 +4346,9 @@
         </p:nvSpPr>
         <p:spPr/>
         <p:txBody>
-          <a:bodyPr/>
+          <a:bodyPr>
+            <a:normAutofit fontScale="92500" lnSpcReduction="10000"/>
+          </a:bodyPr>
           <a:lstStyle/>
           <a:p>
             <a:r>
@@ -3974,31 +4357,63 @@
             </a:r>
           </a:p>
           <a:p>
+            <a:pPr lvl="1"/>
+            <a:r>
+              <a:rPr lang="en-US" dirty="0"/>
+              <a:t>A class that has functions that are a one-to-one mapping of possible API requests</a:t>
+            </a:r>
+          </a:p>
+          <a:p>
             <a:r>
               <a:rPr lang="en-US" dirty="0"/>
               <a:t>Model</a:t>
             </a:r>
           </a:p>
           <a:p>
+            <a:pPr lvl="1"/>
+            <a:r>
+              <a:rPr lang="en-US" dirty="0"/>
+              <a:t>An object representation of a JSON request or response</a:t>
+            </a:r>
+          </a:p>
+          <a:p>
             <a:r>
               <a:rPr lang="en-US" dirty="0"/>
               <a:t>Entity</a:t>
             </a:r>
           </a:p>
           <a:p>
+            <a:pPr lvl="1"/>
+            <a:r>
+              <a:rPr lang="en-US" dirty="0"/>
+              <a:t>A model that has been attached to an API response</a:t>
+            </a:r>
+          </a:p>
+          <a:p>
             <a:r>
               <a:rPr lang="en-US" dirty="0"/>
               <a:t>Behavior</a:t>
             </a:r>
           </a:p>
           <a:p>
+            <a:pPr lvl="1"/>
+            <a:r>
+              <a:rPr lang="en-US" dirty="0"/>
+              <a:t>A method that encapsulates a logical series of API requests</a:t>
+            </a:r>
+          </a:p>
+          <a:p>
             <a:r>
               <a:rPr lang="en-US" dirty="0"/>
               <a:t>Composite</a:t>
             </a:r>
           </a:p>
           <a:p>
-            <a:endParaRPr lang="en-US" dirty="0"/>
+            <a:pPr lvl="1"/>
+            <a:r>
+              <a:rPr lang="en-US" dirty="0"/>
+              <a:t>A class that represents all aspects of a given API, including its client, models, configuration, and behaviors</a:t>
+            </a:r>
           </a:p>
         </p:txBody>
       </p:sp>
@@ -4055,7 +4470,7 @@
           <a:p>
             <a:r>
               <a:rPr lang="en-US" dirty="0"/>
-              <a:t>Implementation – Package Structure</a:t>
+              <a:t>Cafe Project Package Structure</a:t>
             </a:r>
           </a:p>
         </p:txBody>
@@ -4083,15 +4498,55 @@
           <a:p>
             <a:r>
               <a:rPr lang="en-US" dirty="0"/>
-              <a:t>Package Structure</a:t>
-            </a:r>
-          </a:p>
-          <a:p>
-            <a:r>
-              <a:rPr lang="en-US"/>
-              <a:t>Config Classes</a:t>
-            </a:r>
-            <a:endParaRPr lang="en-US" dirty="0"/>
+              <a:t>One package per product</a:t>
+            </a:r>
+          </a:p>
+          <a:p>
+            <a:r>
+              <a:rPr lang="en-US" dirty="0"/>
+              <a:t>One sub-package for each API endpoint</a:t>
+            </a:r>
+          </a:p>
+          <a:p>
+            <a:r>
+              <a:rPr lang="en-US" dirty="0"/>
+              <a:t>For each endpoint:</a:t>
+            </a:r>
+          </a:p>
+          <a:p>
+            <a:pPr lvl="1"/>
+            <a:r>
+              <a:rPr lang="en-US" dirty="0"/>
+              <a:t>Model definitions</a:t>
+            </a:r>
+          </a:p>
+          <a:p>
+            <a:pPr lvl="1"/>
+            <a:r>
+              <a:rPr lang="en-US" dirty="0"/>
+              <a:t>API client</a:t>
+            </a:r>
+          </a:p>
+          <a:p>
+            <a:pPr lvl="1"/>
+            <a:r>
+              <a:rPr lang="en-US" dirty="0"/>
+              <a:t>Behaviors class</a:t>
+            </a:r>
+          </a:p>
+          <a:p>
+            <a:pPr lvl="1"/>
+            <a:r>
+              <a:rPr lang="en-US" dirty="0"/>
+              <a:t>Configuration class</a:t>
+            </a:r>
+          </a:p>
+          <a:p>
+            <a:pPr lvl="1"/>
+            <a:r>
+              <a:rPr lang="en-US" dirty="0"/>
+              <a:t>Composite class</a:t>
+            </a:r>
           </a:p>
         </p:txBody>
       </p:sp>
@@ -4148,7 +4603,7 @@
           <a:p>
             <a:r>
               <a:rPr lang="en-US" dirty="0"/>
-              <a:t>Implementation – Configuration Classes</a:t>
+              <a:t>Example – Configuration Classes</a:t>
             </a:r>
           </a:p>
         </p:txBody>

</xml_diff>